<commit_message>
Aggiornate slides e aggiornato README principale.
</commit_message>
<xml_diff>
--- a/docs/Slides/PongGame.pptx
+++ b/docs/Slides/PongGame.pptx
@@ -7,11 +7,13 @@
   <p:sldIdLst>
     <p:sldId id="256" r:id="rId2"/>
     <p:sldId id="257" r:id="rId3"/>
-    <p:sldId id="258" r:id="rId4"/>
-    <p:sldId id="259" r:id="rId5"/>
-    <p:sldId id="260" r:id="rId6"/>
-    <p:sldId id="262" r:id="rId7"/>
-    <p:sldId id="263" r:id="rId8"/>
+    <p:sldId id="262" r:id="rId4"/>
+    <p:sldId id="264" r:id="rId5"/>
+    <p:sldId id="259" r:id="rId6"/>
+    <p:sldId id="258" r:id="rId7"/>
+    <p:sldId id="260" r:id="rId8"/>
+    <p:sldId id="265" r:id="rId9"/>
+    <p:sldId id="263" r:id="rId10"/>
   </p:sldIdLst>
   <p:sldSz cx="12192000" cy="6858000"/>
   <p:notesSz cx="6858000" cy="9144000"/>
@@ -265,7 +267,7 @@
           <a:p>
             <a:fld id="{4A7F3829-CA59-4BB6-BE20-12351E43F592}" type="datetimeFigureOut">
               <a:rPr lang="it-IT" smtClean="0"/>
-              <a:t>19/11/2023</a:t>
+              <a:t>28/11/2023</a:t>
             </a:fld>
             <a:endParaRPr lang="it-IT"/>
           </a:p>
@@ -463,7 +465,7 @@
           <a:p>
             <a:fld id="{4A7F3829-CA59-4BB6-BE20-12351E43F592}" type="datetimeFigureOut">
               <a:rPr lang="it-IT" smtClean="0"/>
-              <a:t>19/11/2023</a:t>
+              <a:t>28/11/2023</a:t>
             </a:fld>
             <a:endParaRPr lang="it-IT"/>
           </a:p>
@@ -671,7 +673,7 @@
           <a:p>
             <a:fld id="{4A7F3829-CA59-4BB6-BE20-12351E43F592}" type="datetimeFigureOut">
               <a:rPr lang="it-IT" smtClean="0"/>
-              <a:t>19/11/2023</a:t>
+              <a:t>28/11/2023</a:t>
             </a:fld>
             <a:endParaRPr lang="it-IT"/>
           </a:p>
@@ -869,7 +871,7 @@
           <a:p>
             <a:fld id="{4A7F3829-CA59-4BB6-BE20-12351E43F592}" type="datetimeFigureOut">
               <a:rPr lang="it-IT" smtClean="0"/>
-              <a:t>19/11/2023</a:t>
+              <a:t>28/11/2023</a:t>
             </a:fld>
             <a:endParaRPr lang="it-IT"/>
           </a:p>
@@ -1144,7 +1146,7 @@
           <a:p>
             <a:fld id="{4A7F3829-CA59-4BB6-BE20-12351E43F592}" type="datetimeFigureOut">
               <a:rPr lang="it-IT" smtClean="0"/>
-              <a:t>19/11/2023</a:t>
+              <a:t>28/11/2023</a:t>
             </a:fld>
             <a:endParaRPr lang="it-IT"/>
           </a:p>
@@ -1409,7 +1411,7 @@
           <a:p>
             <a:fld id="{4A7F3829-CA59-4BB6-BE20-12351E43F592}" type="datetimeFigureOut">
               <a:rPr lang="it-IT" smtClean="0"/>
-              <a:t>19/11/2023</a:t>
+              <a:t>28/11/2023</a:t>
             </a:fld>
             <a:endParaRPr lang="it-IT"/>
           </a:p>
@@ -1821,7 +1823,7 @@
           <a:p>
             <a:fld id="{4A7F3829-CA59-4BB6-BE20-12351E43F592}" type="datetimeFigureOut">
               <a:rPr lang="it-IT" smtClean="0"/>
-              <a:t>19/11/2023</a:t>
+              <a:t>28/11/2023</a:t>
             </a:fld>
             <a:endParaRPr lang="it-IT"/>
           </a:p>
@@ -1962,7 +1964,7 @@
           <a:p>
             <a:fld id="{4A7F3829-CA59-4BB6-BE20-12351E43F592}" type="datetimeFigureOut">
               <a:rPr lang="it-IT" smtClean="0"/>
-              <a:t>19/11/2023</a:t>
+              <a:t>28/11/2023</a:t>
             </a:fld>
             <a:endParaRPr lang="it-IT"/>
           </a:p>
@@ -2075,7 +2077,7 @@
           <a:p>
             <a:fld id="{4A7F3829-CA59-4BB6-BE20-12351E43F592}" type="datetimeFigureOut">
               <a:rPr lang="it-IT" smtClean="0"/>
-              <a:t>19/11/2023</a:t>
+              <a:t>28/11/2023</a:t>
             </a:fld>
             <a:endParaRPr lang="it-IT"/>
           </a:p>
@@ -2386,7 +2388,7 @@
           <a:p>
             <a:fld id="{4A7F3829-CA59-4BB6-BE20-12351E43F592}" type="datetimeFigureOut">
               <a:rPr lang="it-IT" smtClean="0"/>
-              <a:t>19/11/2023</a:t>
+              <a:t>28/11/2023</a:t>
             </a:fld>
             <a:endParaRPr lang="it-IT"/>
           </a:p>
@@ -2674,7 +2676,7 @@
           <a:p>
             <a:fld id="{4A7F3829-CA59-4BB6-BE20-12351E43F592}" type="datetimeFigureOut">
               <a:rPr lang="it-IT" smtClean="0"/>
-              <a:t>19/11/2023</a:t>
+              <a:t>28/11/2023</a:t>
             </a:fld>
             <a:endParaRPr lang="it-IT"/>
           </a:p>
@@ -2915,7 +2917,7 @@
           <a:p>
             <a:fld id="{4A7F3829-CA59-4BB6-BE20-12351E43F592}" type="datetimeFigureOut">
               <a:rPr lang="it-IT" smtClean="0"/>
-              <a:t>19/11/2023</a:t>
+              <a:t>28/11/2023</a:t>
             </a:fld>
             <a:endParaRPr lang="it-IT"/>
           </a:p>
@@ -3421,38 +3423,14 @@
           </a:p>
           <a:p>
             <a:r>
-              <a:rPr lang="it-IT" sz="2400" dirty="0" err="1">
-                <a:solidFill>
-                  <a:schemeClr val="bg1"/>
-                </a:solidFill>
-                <a:latin typeface="Joystix Monospace" panose="02010609020102020304" pitchFamily="49" charset="0"/>
-              </a:rPr>
-              <a:t>bertiato</a:t>
-            </a:r>
-            <a:r>
               <a:rPr lang="it-IT" sz="2400" dirty="0">
                 <a:solidFill>
                   <a:schemeClr val="bg1"/>
                 </a:solidFill>
                 <a:latin typeface="Joystix Monospace" panose="02010609020102020304" pitchFamily="49" charset="0"/>
               </a:rPr>
-              <a:t> luca &amp; radice </a:t>
-            </a:r>
-            <a:r>
-              <a:rPr lang="it-IT" sz="2400" dirty="0" err="1">
-                <a:solidFill>
-                  <a:schemeClr val="bg1"/>
-                </a:solidFill>
-                <a:latin typeface="Joystix Monospace" panose="02010609020102020304" pitchFamily="49" charset="0"/>
-              </a:rPr>
-              <a:t>simone</a:t>
-            </a:r>
-            <a:endParaRPr lang="it-IT" sz="2400" dirty="0">
-              <a:solidFill>
-                <a:schemeClr val="bg1"/>
-              </a:solidFill>
-              <a:latin typeface="Joystix Monospace" panose="02010609020102020304" pitchFamily="49" charset="0"/>
-            </a:endParaRPr>
+              <a:t>bertiato luca &amp; radice simone</a:t>
+            </a:r>
           </a:p>
         </p:txBody>
       </p:sp>
@@ -3602,10 +3580,10 @@
       </p:grpSpPr>
       <p:sp>
         <p:nvSpPr>
-          <p:cNvPr id="2" name="CasellaDiTesto 1">
-            <a:extLst>
-              <a:ext uri="{FF2B5EF4-FFF2-40B4-BE49-F238E27FC236}">
-                <a16:creationId xmlns:a16="http://schemas.microsoft.com/office/drawing/2014/main" id="{964D8EFA-BAE7-185C-2A9C-350BA786E3D6}"/>
+          <p:cNvPr id="3" name="CasellaDiTesto 2">
+            <a:extLst>
+              <a:ext uri="{FF2B5EF4-FFF2-40B4-BE49-F238E27FC236}">
+                <a16:creationId xmlns:a16="http://schemas.microsoft.com/office/drawing/2014/main" id="{81D0D9F6-DBAA-1C53-E580-3506CD81685F}"/>
               </a:ext>
             </a:extLst>
           </p:cNvPr>
@@ -3614,8 +3592,8 @@
         </p:nvSpPr>
         <p:spPr>
           <a:xfrm>
-            <a:off x="294271" y="242352"/>
-            <a:ext cx="5031205" cy="954107"/>
+            <a:off x="900801" y="2521059"/>
+            <a:ext cx="10390397" cy="1815882"/>
           </a:xfrm>
           <a:prstGeom prst="rect">
             <a:avLst/>
@@ -3628,6 +3606,602 @@
           </a:bodyPr>
           <a:lstStyle/>
           <a:p>
+            <a:pPr marL="0" marR="0" lvl="0" indent="0" algn="ctr" defTabSz="914400" rtl="0" eaLnBrk="1" fontAlgn="auto" latinLnBrk="0" hangingPunct="1">
+              <a:lnSpc>
+                <a:spcPct val="100000"/>
+              </a:lnSpc>
+              <a:spcBef>
+                <a:spcPts val="0"/>
+              </a:spcBef>
+              <a:spcAft>
+                <a:spcPts val="0"/>
+              </a:spcAft>
+              <a:buClrTx/>
+              <a:buSzTx/>
+              <a:buFontTx/>
+              <a:buNone/>
+              <a:tabLst/>
+              <a:defRPr/>
+            </a:pPr>
+            <a:r>
+              <a:rPr kumimoji="0" lang="it-IT" sz="2800" b="0" i="0" u="none" strike="noStrike" kern="1200" cap="none" spc="0" normalizeH="0" baseline="0" noProof="0" dirty="0">
+                <a:ln>
+                  <a:noFill/>
+                </a:ln>
+                <a:solidFill>
+                  <a:prstClr val="white"/>
+                </a:solidFill>
+                <a:effectLst/>
+                <a:uLnTx/>
+                <a:uFillTx/>
+                <a:latin typeface="Joystix Monospace" panose="02010609020102020304" pitchFamily="49" charset="0"/>
+                <a:ea typeface="+mn-ea"/>
+                <a:cs typeface="+mn-cs"/>
+              </a:rPr>
+              <a:t>Per rendere il gioco più divertente e intrigante abbiamo optato per l’aggiunta di </a:t>
+            </a:r>
+            <a:r>
+              <a:rPr kumimoji="0" lang="it-IT" sz="2800" b="0" i="0" u="none" strike="noStrike" kern="1200" cap="none" spc="0" normalizeH="0" baseline="0" noProof="0" dirty="0">
+                <a:ln>
+                  <a:noFill/>
+                </a:ln>
+                <a:solidFill>
+                  <a:srgbClr val="FF0000"/>
+                </a:solidFill>
+                <a:effectLst/>
+                <a:uLnTx/>
+                <a:uFillTx/>
+                <a:latin typeface="Joystix Monospace" panose="02010609020102020304" pitchFamily="49" charset="0"/>
+                <a:ea typeface="+mn-ea"/>
+                <a:cs typeface="+mn-cs"/>
+              </a:rPr>
+              <a:t>power up </a:t>
+            </a:r>
+            <a:r>
+              <a:rPr kumimoji="0" lang="it-IT" sz="2800" b="0" i="0" u="none" strike="noStrike" kern="1200" cap="none" spc="0" normalizeH="0" baseline="0" noProof="0" dirty="0">
+                <a:ln>
+                  <a:noFill/>
+                </a:ln>
+                <a:solidFill>
+                  <a:schemeClr val="bg1"/>
+                </a:solidFill>
+                <a:effectLst/>
+                <a:uLnTx/>
+                <a:uFillTx/>
+                <a:latin typeface="Joystix Monospace" panose="02010609020102020304" pitchFamily="49" charset="0"/>
+                <a:ea typeface="+mn-ea"/>
+                <a:cs typeface="+mn-cs"/>
+              </a:rPr>
+              <a:t>che si generano regolarmente</a:t>
+            </a:r>
+          </a:p>
+        </p:txBody>
+      </p:sp>
+    </p:spTree>
+    <p:extLst>
+      <p:ext uri="{BB962C8B-B14F-4D97-AF65-F5344CB8AC3E}">
+        <p14:creationId xmlns:p14="http://schemas.microsoft.com/office/powerpoint/2010/main" val="2590835278"/>
+      </p:ext>
+    </p:extLst>
+  </p:cSld>
+  <p:clrMapOvr>
+    <a:masterClrMapping/>
+  </p:clrMapOvr>
+</p:sld>
+</file>
+
+<file path=ppt/slides/slide4.xml><?xml version="1.0" encoding="utf-8"?>
+<p:sld xmlns:a="http://schemas.openxmlformats.org/drawingml/2006/main" xmlns:r="http://schemas.openxmlformats.org/officeDocument/2006/relationships" xmlns:p="http://schemas.openxmlformats.org/presentationml/2006/main">
+  <p:cSld>
+    <p:bg>
+      <p:bgPr>
+        <a:solidFill>
+          <a:schemeClr val="tx1"/>
+        </a:solidFill>
+        <a:effectLst/>
+      </p:bgPr>
+    </p:bg>
+    <p:spTree>
+      <p:nvGrpSpPr>
+        <p:cNvPr id="1" name=""/>
+        <p:cNvGrpSpPr/>
+        <p:nvPr/>
+      </p:nvGrpSpPr>
+      <p:grpSpPr>
+        <a:xfrm>
+          <a:off x="0" y="0"/>
+          <a:ext cx="0" cy="0"/>
+          <a:chOff x="0" y="0"/>
+          <a:chExt cx="0" cy="0"/>
+        </a:xfrm>
+      </p:grpSpPr>
+      <p:sp>
+        <p:nvSpPr>
+          <p:cNvPr id="3" name="CasellaDiTesto 2">
+            <a:extLst>
+              <a:ext uri="{FF2B5EF4-FFF2-40B4-BE49-F238E27FC236}">
+                <a16:creationId xmlns:a16="http://schemas.microsoft.com/office/drawing/2014/main" id="{81D0D9F6-DBAA-1C53-E580-3506CD81685F}"/>
+              </a:ext>
+            </a:extLst>
+          </p:cNvPr>
+          <p:cNvSpPr txBox="1"/>
+          <p:nvPr/>
+        </p:nvSpPr>
+        <p:spPr>
+          <a:xfrm>
+            <a:off x="900801" y="1122665"/>
+            <a:ext cx="10390397" cy="1384995"/>
+          </a:xfrm>
+          <a:prstGeom prst="rect">
+            <a:avLst/>
+          </a:prstGeom>
+          <a:noFill/>
+        </p:spPr>
+        <p:txBody>
+          <a:bodyPr wrap="square" rtlCol="0">
+            <a:spAutoFit/>
+          </a:bodyPr>
+          <a:lstStyle/>
+          <a:p>
+            <a:pPr marL="0" marR="0" lvl="0" indent="0" algn="ctr" defTabSz="914400" rtl="0" eaLnBrk="1" fontAlgn="auto" latinLnBrk="0" hangingPunct="1">
+              <a:lnSpc>
+                <a:spcPct val="100000"/>
+              </a:lnSpc>
+              <a:spcBef>
+                <a:spcPts val="0"/>
+              </a:spcBef>
+              <a:spcAft>
+                <a:spcPts val="0"/>
+              </a:spcAft>
+              <a:buClrTx/>
+              <a:buSzTx/>
+              <a:buFontTx/>
+              <a:buNone/>
+              <a:tabLst/>
+              <a:defRPr/>
+            </a:pPr>
+            <a:r>
+              <a:rPr kumimoji="0" lang="it-IT" sz="2800" b="0" i="0" u="none" strike="noStrike" kern="1200" cap="none" spc="0" normalizeH="0" baseline="0" noProof="0" dirty="0">
+                <a:ln>
+                  <a:noFill/>
+                </a:ln>
+                <a:solidFill>
+                  <a:prstClr val="white"/>
+                </a:solidFill>
+                <a:effectLst/>
+                <a:uLnTx/>
+                <a:uFillTx/>
+                <a:latin typeface="Joystix Monospace" panose="02010609020102020304" pitchFamily="49" charset="0"/>
+                <a:ea typeface="+mn-ea"/>
+                <a:cs typeface="+mn-cs"/>
+              </a:rPr>
+              <a:t>In particolare ne abbiamo realizzati due che influiscono sul </a:t>
+            </a:r>
+            <a:r>
+              <a:rPr kumimoji="0" lang="it-IT" sz="2800" b="0" i="0" u="none" strike="noStrike" kern="1200" cap="none" spc="0" normalizeH="0" baseline="0" noProof="0" dirty="0">
+                <a:ln>
+                  <a:noFill/>
+                </a:ln>
+                <a:solidFill>
+                  <a:srgbClr val="FF0000"/>
+                </a:solidFill>
+                <a:effectLst/>
+                <a:uLnTx/>
+                <a:uFillTx/>
+                <a:latin typeface="Joystix Monospace" panose="02010609020102020304" pitchFamily="49" charset="0"/>
+                <a:ea typeface="+mn-ea"/>
+                <a:cs typeface="+mn-cs"/>
+              </a:rPr>
+              <a:t>punteggio</a:t>
+            </a:r>
+            <a:r>
+              <a:rPr kumimoji="0" lang="it-IT" sz="2800" b="0" i="0" u="none" strike="noStrike" kern="1200" cap="none" spc="0" normalizeH="0" baseline="0" noProof="0" dirty="0">
+                <a:ln>
+                  <a:noFill/>
+                </a:ln>
+                <a:solidFill>
+                  <a:prstClr val="white"/>
+                </a:solidFill>
+                <a:effectLst/>
+                <a:uLnTx/>
+                <a:uFillTx/>
+                <a:latin typeface="Joystix Monospace" panose="02010609020102020304" pitchFamily="49" charset="0"/>
+                <a:ea typeface="+mn-ea"/>
+                <a:cs typeface="+mn-cs"/>
+              </a:rPr>
+              <a:t> dei giocatori:</a:t>
+            </a:r>
+            <a:endParaRPr kumimoji="0" lang="it-IT" sz="2800" b="0" i="0" u="none" strike="noStrike" kern="1200" cap="none" spc="0" normalizeH="0" baseline="0" noProof="0" dirty="0">
+              <a:ln>
+                <a:noFill/>
+              </a:ln>
+              <a:solidFill>
+                <a:schemeClr val="bg1"/>
+              </a:solidFill>
+              <a:effectLst/>
+              <a:uLnTx/>
+              <a:uFillTx/>
+              <a:latin typeface="Joystix Monospace" panose="02010609020102020304" pitchFamily="49" charset="0"/>
+              <a:ea typeface="+mn-ea"/>
+              <a:cs typeface="+mn-cs"/>
+            </a:endParaRPr>
+          </a:p>
+        </p:txBody>
+      </p:sp>
+      <p:sp>
+        <p:nvSpPr>
+          <p:cNvPr id="6" name="Rettangolo 5">
+            <a:extLst>
+              <a:ext uri="{FF2B5EF4-FFF2-40B4-BE49-F238E27FC236}">
+                <a16:creationId xmlns:a16="http://schemas.microsoft.com/office/drawing/2014/main" id="{C2A718C1-A5D1-86A5-4827-8C957C2B7AA7}"/>
+              </a:ext>
+            </a:extLst>
+          </p:cNvPr>
+          <p:cNvSpPr>
+            <a:spLocks noChangeAspect="1"/>
+          </p:cNvSpPr>
+          <p:nvPr/>
+        </p:nvSpPr>
+        <p:spPr>
+          <a:xfrm>
+            <a:off x="1276350" y="3427408"/>
+            <a:ext cx="923925" cy="923925"/>
+          </a:xfrm>
+          <a:prstGeom prst="rect">
+            <a:avLst/>
+          </a:prstGeom>
+          <a:solidFill>
+            <a:srgbClr val="0000FF"/>
+          </a:solidFill>
+          <a:ln>
+            <a:noFill/>
+          </a:ln>
+        </p:spPr>
+        <p:style>
+          <a:lnRef idx="2">
+            <a:schemeClr val="accent1">
+              <a:shade val="15000"/>
+            </a:schemeClr>
+          </a:lnRef>
+          <a:fillRef idx="1">
+            <a:schemeClr val="accent1"/>
+          </a:fillRef>
+          <a:effectRef idx="0">
+            <a:schemeClr val="accent1"/>
+          </a:effectRef>
+          <a:fontRef idx="minor">
+            <a:schemeClr val="lt1"/>
+          </a:fontRef>
+        </p:style>
+        <p:txBody>
+          <a:bodyPr rtlCol="0" anchor="ctr"/>
+          <a:lstStyle/>
+          <a:p>
+            <a:pPr algn="ctr"/>
+            <a:endParaRPr lang="it-IT"/>
+          </a:p>
+        </p:txBody>
+      </p:sp>
+      <p:sp>
+        <p:nvSpPr>
+          <p:cNvPr id="8" name="Rettangolo 7">
+            <a:extLst>
+              <a:ext uri="{FF2B5EF4-FFF2-40B4-BE49-F238E27FC236}">
+                <a16:creationId xmlns:a16="http://schemas.microsoft.com/office/drawing/2014/main" id="{5E0B2011-7258-16AF-8EAB-834B5185355A}"/>
+              </a:ext>
+            </a:extLst>
+          </p:cNvPr>
+          <p:cNvSpPr>
+            <a:spLocks noChangeAspect="1"/>
+          </p:cNvSpPr>
+          <p:nvPr/>
+        </p:nvSpPr>
+        <p:spPr>
+          <a:xfrm>
+            <a:off x="1284287" y="4831550"/>
+            <a:ext cx="923925" cy="923925"/>
+          </a:xfrm>
+          <a:prstGeom prst="rect">
+            <a:avLst/>
+          </a:prstGeom>
+          <a:solidFill>
+            <a:srgbClr val="FF0000"/>
+          </a:solidFill>
+          <a:ln>
+            <a:noFill/>
+          </a:ln>
+        </p:spPr>
+        <p:style>
+          <a:lnRef idx="2">
+            <a:schemeClr val="accent1">
+              <a:shade val="15000"/>
+            </a:schemeClr>
+          </a:lnRef>
+          <a:fillRef idx="1">
+            <a:schemeClr val="accent1"/>
+          </a:fillRef>
+          <a:effectRef idx="0">
+            <a:schemeClr val="accent1"/>
+          </a:effectRef>
+          <a:fontRef idx="minor">
+            <a:schemeClr val="lt1"/>
+          </a:fontRef>
+        </p:style>
+        <p:txBody>
+          <a:bodyPr rtlCol="0" anchor="ctr"/>
+          <a:lstStyle/>
+          <a:p>
+            <a:pPr algn="ctr"/>
+            <a:endParaRPr lang="it-IT"/>
+          </a:p>
+        </p:txBody>
+      </p:sp>
+      <p:cxnSp>
+        <p:nvCxnSpPr>
+          <p:cNvPr id="9" name="Connettore 2 8">
+            <a:extLst>
+              <a:ext uri="{FF2B5EF4-FFF2-40B4-BE49-F238E27FC236}">
+                <a16:creationId xmlns:a16="http://schemas.microsoft.com/office/drawing/2014/main" id="{AA20F29E-61A4-1F0C-68AA-8B7E4C52F0A4}"/>
+              </a:ext>
+            </a:extLst>
+          </p:cNvPr>
+          <p:cNvCxnSpPr>
+            <a:cxnSpLocks/>
+          </p:cNvCxnSpPr>
+          <p:nvPr/>
+        </p:nvCxnSpPr>
+        <p:spPr>
+          <a:xfrm>
+            <a:off x="2662237" y="3889370"/>
+            <a:ext cx="5600700" cy="0"/>
+          </a:xfrm>
+          <a:prstGeom prst="straightConnector1">
+            <a:avLst/>
+          </a:prstGeom>
+          <a:ln w="50800">
+            <a:solidFill>
+              <a:schemeClr val="bg1"/>
+            </a:solidFill>
+            <a:prstDash val="sysDot"/>
+            <a:tailEnd type="triangle"/>
+          </a:ln>
+        </p:spPr>
+        <p:style>
+          <a:lnRef idx="1">
+            <a:schemeClr val="accent1"/>
+          </a:lnRef>
+          <a:fillRef idx="0">
+            <a:schemeClr val="accent1"/>
+          </a:fillRef>
+          <a:effectRef idx="0">
+            <a:schemeClr val="accent1"/>
+          </a:effectRef>
+          <a:fontRef idx="minor">
+            <a:schemeClr val="tx1"/>
+          </a:fontRef>
+        </p:style>
+      </p:cxnSp>
+      <p:sp>
+        <p:nvSpPr>
+          <p:cNvPr id="12" name="CasellaDiTesto 11">
+            <a:extLst>
+              <a:ext uri="{FF2B5EF4-FFF2-40B4-BE49-F238E27FC236}">
+                <a16:creationId xmlns:a16="http://schemas.microsoft.com/office/drawing/2014/main" id="{5BCE9E49-90BD-94D6-086C-9BBA971CA921}"/>
+              </a:ext>
+            </a:extLst>
+          </p:cNvPr>
+          <p:cNvSpPr txBox="1">
+            <a:spLocks noChangeAspect="1"/>
+          </p:cNvSpPr>
+          <p:nvPr/>
+        </p:nvSpPr>
+        <p:spPr>
+          <a:xfrm>
+            <a:off x="8734068" y="3658537"/>
+            <a:ext cx="2181582" cy="461665"/>
+          </a:xfrm>
+          <a:prstGeom prst="rect">
+            <a:avLst/>
+          </a:prstGeom>
+          <a:noFill/>
+          <a:ln>
+            <a:solidFill>
+              <a:schemeClr val="bg1"/>
+            </a:solidFill>
+            <a:prstDash val="solid"/>
+          </a:ln>
+        </p:spPr>
+        <p:txBody>
+          <a:bodyPr wrap="square" rtlCol="0">
+            <a:spAutoFit/>
+          </a:bodyPr>
+          <a:lstStyle/>
+          <a:p>
+            <a:pPr algn="ctr"/>
+            <a:r>
+              <a:rPr lang="it-IT" sz="2400" dirty="0">
+                <a:solidFill>
+                  <a:schemeClr val="bg1"/>
+                </a:solidFill>
+                <a:latin typeface="Joystix Monospace" panose="02010609020102020304" pitchFamily="49" charset="0"/>
+              </a:rPr>
+              <a:t>+1 punto</a:t>
+            </a:r>
+            <a:endParaRPr lang="it-IT" sz="2400" dirty="0">
+              <a:solidFill>
+                <a:srgbClr val="FF0000"/>
+              </a:solidFill>
+              <a:latin typeface="Joystix Monospace" panose="02010609020102020304" pitchFamily="49" charset="0"/>
+            </a:endParaRPr>
+          </a:p>
+        </p:txBody>
+      </p:sp>
+      <p:cxnSp>
+        <p:nvCxnSpPr>
+          <p:cNvPr id="16" name="Connettore 2 15">
+            <a:extLst>
+              <a:ext uri="{FF2B5EF4-FFF2-40B4-BE49-F238E27FC236}">
+                <a16:creationId xmlns:a16="http://schemas.microsoft.com/office/drawing/2014/main" id="{595342CF-4EDC-5BFC-817E-9FBD4520B9E3}"/>
+              </a:ext>
+            </a:extLst>
+          </p:cNvPr>
+          <p:cNvCxnSpPr>
+            <a:cxnSpLocks/>
+          </p:cNvCxnSpPr>
+          <p:nvPr/>
+        </p:nvCxnSpPr>
+        <p:spPr>
+          <a:xfrm>
+            <a:off x="2654300" y="5273670"/>
+            <a:ext cx="5600700" cy="0"/>
+          </a:xfrm>
+          <a:prstGeom prst="straightConnector1">
+            <a:avLst/>
+          </a:prstGeom>
+          <a:ln w="50800">
+            <a:solidFill>
+              <a:schemeClr val="bg1"/>
+            </a:solidFill>
+            <a:prstDash val="sysDot"/>
+            <a:tailEnd type="triangle"/>
+          </a:ln>
+        </p:spPr>
+        <p:style>
+          <a:lnRef idx="1">
+            <a:schemeClr val="accent1"/>
+          </a:lnRef>
+          <a:fillRef idx="0">
+            <a:schemeClr val="accent1"/>
+          </a:fillRef>
+          <a:effectRef idx="0">
+            <a:schemeClr val="accent1"/>
+          </a:effectRef>
+          <a:fontRef idx="minor">
+            <a:schemeClr val="tx1"/>
+          </a:fontRef>
+        </p:style>
+      </p:cxnSp>
+      <p:sp>
+        <p:nvSpPr>
+          <p:cNvPr id="17" name="CasellaDiTesto 16">
+            <a:extLst>
+              <a:ext uri="{FF2B5EF4-FFF2-40B4-BE49-F238E27FC236}">
+                <a16:creationId xmlns:a16="http://schemas.microsoft.com/office/drawing/2014/main" id="{C564FC97-3E15-6DD0-F33B-59BAFF7F43B1}"/>
+              </a:ext>
+            </a:extLst>
+          </p:cNvPr>
+          <p:cNvSpPr txBox="1">
+            <a:spLocks noChangeAspect="1"/>
+          </p:cNvSpPr>
+          <p:nvPr/>
+        </p:nvSpPr>
+        <p:spPr>
+          <a:xfrm>
+            <a:off x="8726131" y="5042837"/>
+            <a:ext cx="2181582" cy="461665"/>
+          </a:xfrm>
+          <a:prstGeom prst="rect">
+            <a:avLst/>
+          </a:prstGeom>
+          <a:noFill/>
+          <a:ln>
+            <a:solidFill>
+              <a:schemeClr val="bg1"/>
+            </a:solidFill>
+            <a:prstDash val="solid"/>
+          </a:ln>
+        </p:spPr>
+        <p:txBody>
+          <a:bodyPr wrap="square" rtlCol="0">
+            <a:spAutoFit/>
+          </a:bodyPr>
+          <a:lstStyle/>
+          <a:p>
+            <a:pPr algn="ctr"/>
+            <a:r>
+              <a:rPr lang="it-IT" sz="2400" dirty="0">
+                <a:solidFill>
+                  <a:schemeClr val="bg1"/>
+                </a:solidFill>
+                <a:latin typeface="Joystix Monospace" panose="02010609020102020304" pitchFamily="49" charset="0"/>
+              </a:rPr>
+              <a:t>-1 punto</a:t>
+            </a:r>
+            <a:endParaRPr lang="it-IT" sz="2400" dirty="0">
+              <a:solidFill>
+                <a:srgbClr val="FF0000"/>
+              </a:solidFill>
+              <a:latin typeface="Joystix Monospace" panose="02010609020102020304" pitchFamily="49" charset="0"/>
+            </a:endParaRPr>
+          </a:p>
+        </p:txBody>
+      </p:sp>
+    </p:spTree>
+    <p:extLst>
+      <p:ext uri="{BB962C8B-B14F-4D97-AF65-F5344CB8AC3E}">
+        <p14:creationId xmlns:p14="http://schemas.microsoft.com/office/powerpoint/2010/main" val="3978832392"/>
+      </p:ext>
+    </p:extLst>
+  </p:cSld>
+  <p:clrMapOvr>
+    <a:masterClrMapping/>
+  </p:clrMapOvr>
+</p:sld>
+</file>
+
+<file path=ppt/slides/slide5.xml><?xml version="1.0" encoding="utf-8"?>
+<p:sld xmlns:a="http://schemas.openxmlformats.org/drawingml/2006/main" xmlns:r="http://schemas.openxmlformats.org/officeDocument/2006/relationships" xmlns:p="http://schemas.openxmlformats.org/presentationml/2006/main">
+  <p:cSld>
+    <p:bg>
+      <p:bgPr>
+        <a:solidFill>
+          <a:schemeClr val="tx1"/>
+        </a:solidFill>
+        <a:effectLst/>
+      </p:bgPr>
+    </p:bg>
+    <p:spTree>
+      <p:nvGrpSpPr>
+        <p:cNvPr id="1" name=""/>
+        <p:cNvGrpSpPr/>
+        <p:nvPr/>
+      </p:nvGrpSpPr>
+      <p:grpSpPr>
+        <a:xfrm>
+          <a:off x="0" y="0"/>
+          <a:ext cx="0" cy="0"/>
+          <a:chOff x="0" y="0"/>
+          <a:chExt cx="0" cy="0"/>
+        </a:xfrm>
+      </p:grpSpPr>
+      <p:sp>
+        <p:nvSpPr>
+          <p:cNvPr id="2" name="CasellaDiTesto 1">
+            <a:extLst>
+              <a:ext uri="{FF2B5EF4-FFF2-40B4-BE49-F238E27FC236}">
+                <a16:creationId xmlns:a16="http://schemas.microsoft.com/office/drawing/2014/main" id="{7761A8D3-44DE-E5DB-738C-061BC868F717}"/>
+              </a:ext>
+            </a:extLst>
+          </p:cNvPr>
+          <p:cNvSpPr txBox="1"/>
+          <p:nvPr/>
+        </p:nvSpPr>
+        <p:spPr>
+          <a:xfrm>
+            <a:off x="1783040" y="2736502"/>
+            <a:ext cx="8625919" cy="1384995"/>
+          </a:xfrm>
+          <a:prstGeom prst="rect">
+            <a:avLst/>
+          </a:prstGeom>
+          <a:noFill/>
+        </p:spPr>
+        <p:txBody>
+          <a:bodyPr wrap="square" rtlCol="0">
+            <a:spAutoFit/>
+          </a:bodyPr>
+          <a:lstStyle/>
+          <a:p>
             <a:pPr algn="ctr"/>
             <a:r>
               <a:rPr lang="it-IT" sz="2800" dirty="0">
@@ -3636,17 +4210,70 @@
                 </a:solidFill>
                 <a:latin typeface="Joystix Monospace" panose="02010609020102020304" pitchFamily="49" charset="0"/>
               </a:rPr>
-              <a:t>Il campo da gioco si presenta così:</a:t>
-            </a:r>
-            <a:endParaRPr lang="it-IT" sz="2800" dirty="0">
-              <a:solidFill>
-                <a:srgbClr val="FF0000"/>
-              </a:solidFill>
-              <a:latin typeface="Joystix Monospace" panose="02010609020102020304" pitchFamily="49" charset="0"/>
-            </a:endParaRPr>
-          </a:p>
-        </p:txBody>
-      </p:sp>
+              <a:t>Le regole sono molto semplici:</a:t>
+            </a:r>
+          </a:p>
+          <a:p>
+            <a:pPr algn="ctr"/>
+            <a:r>
+              <a:rPr lang="it-IT" sz="2800" dirty="0">
+                <a:solidFill>
+                  <a:schemeClr val="bg1"/>
+                </a:solidFill>
+                <a:latin typeface="Joystix Monospace" panose="02010609020102020304" pitchFamily="49" charset="0"/>
+              </a:rPr>
+              <a:t>Il primo giocatore a vincere tre set </a:t>
+            </a:r>
+            <a:r>
+              <a:rPr lang="it-IT" sz="2800" dirty="0">
+                <a:solidFill>
+                  <a:srgbClr val="FF0000"/>
+                </a:solidFill>
+                <a:latin typeface="Joystix Monospace" panose="02010609020102020304" pitchFamily="49" charset="0"/>
+              </a:rPr>
+              <a:t>vince</a:t>
+            </a:r>
+          </a:p>
+        </p:txBody>
+      </p:sp>
+    </p:spTree>
+    <p:extLst>
+      <p:ext uri="{BB962C8B-B14F-4D97-AF65-F5344CB8AC3E}">
+        <p14:creationId xmlns:p14="http://schemas.microsoft.com/office/powerpoint/2010/main" val="3239394465"/>
+      </p:ext>
+    </p:extLst>
+  </p:cSld>
+  <p:clrMapOvr>
+    <a:masterClrMapping/>
+  </p:clrMapOvr>
+</p:sld>
+</file>
+
+<file path=ppt/slides/slide6.xml><?xml version="1.0" encoding="utf-8"?>
+<p:sld xmlns:a="http://schemas.openxmlformats.org/drawingml/2006/main" xmlns:r="http://schemas.openxmlformats.org/officeDocument/2006/relationships" xmlns:p="http://schemas.openxmlformats.org/presentationml/2006/main">
+  <p:cSld>
+    <p:bg>
+      <p:bgPr>
+        <a:solidFill>
+          <a:schemeClr val="tx1"/>
+        </a:solidFill>
+        <a:effectLst/>
+      </p:bgPr>
+    </p:bg>
+    <p:spTree>
+      <p:nvGrpSpPr>
+        <p:cNvPr id="1" name=""/>
+        <p:cNvGrpSpPr/>
+        <p:nvPr/>
+      </p:nvGrpSpPr>
+      <p:grpSpPr>
+        <a:xfrm>
+          <a:off x="0" y="0"/>
+          <a:ext cx="0" cy="0"/>
+          <a:chOff x="0" y="0"/>
+          <a:chExt cx="0" cy="0"/>
+        </a:xfrm>
+      </p:grpSpPr>
       <p:pic>
         <p:nvPicPr>
           <p:cNvPr id="4" name="Immagine 3">
@@ -3682,6 +4309,53 @@
           </a:ln>
         </p:spPr>
       </p:pic>
+      <p:sp>
+        <p:nvSpPr>
+          <p:cNvPr id="2" name="CasellaDiTesto 1">
+            <a:extLst>
+              <a:ext uri="{FF2B5EF4-FFF2-40B4-BE49-F238E27FC236}">
+                <a16:creationId xmlns:a16="http://schemas.microsoft.com/office/drawing/2014/main" id="{964D8EFA-BAE7-185C-2A9C-350BA786E3D6}"/>
+              </a:ext>
+            </a:extLst>
+          </p:cNvPr>
+          <p:cNvSpPr txBox="1"/>
+          <p:nvPr/>
+        </p:nvSpPr>
+        <p:spPr>
+          <a:xfrm>
+            <a:off x="294271" y="242352"/>
+            <a:ext cx="5031205" cy="954107"/>
+          </a:xfrm>
+          <a:prstGeom prst="rect">
+            <a:avLst/>
+          </a:prstGeom>
+          <a:noFill/>
+        </p:spPr>
+        <p:txBody>
+          <a:bodyPr wrap="square" rtlCol="0">
+            <a:spAutoFit/>
+          </a:bodyPr>
+          <a:lstStyle/>
+          <a:p>
+            <a:pPr algn="ctr"/>
+            <a:r>
+              <a:rPr lang="it-IT" sz="2800" dirty="0">
+                <a:solidFill>
+                  <a:schemeClr val="bg1"/>
+                </a:solidFill>
+                <a:latin typeface="Joystix Monospace" panose="02010609020102020304" pitchFamily="49" charset="0"/>
+              </a:rPr>
+              <a:t>Il campo da gioco si presenta così:</a:t>
+            </a:r>
+            <a:endParaRPr lang="it-IT" sz="2800" dirty="0">
+              <a:solidFill>
+                <a:srgbClr val="FF0000"/>
+              </a:solidFill>
+              <a:latin typeface="Joystix Monospace" panose="02010609020102020304" pitchFamily="49" charset="0"/>
+            </a:endParaRPr>
+          </a:p>
+        </p:txBody>
+      </p:sp>
       <p:cxnSp>
         <p:nvCxnSpPr>
           <p:cNvPr id="6" name="Connettore 2 5">
@@ -4066,6 +4740,160 @@
           </a:p>
         </p:txBody>
       </p:sp>
+      <p:pic>
+        <p:nvPicPr>
+          <p:cNvPr id="7" name="Immagine 6">
+            <a:extLst>
+              <a:ext uri="{FF2B5EF4-FFF2-40B4-BE49-F238E27FC236}">
+                <a16:creationId xmlns:a16="http://schemas.microsoft.com/office/drawing/2014/main" id="{47227B2E-3A22-DC3E-0A05-300039568E9C}"/>
+              </a:ext>
+            </a:extLst>
+          </p:cNvPr>
+          <p:cNvPicPr>
+            <a:picLocks noChangeAspect="1"/>
+          </p:cNvPicPr>
+          <p:nvPr/>
+        </p:nvPicPr>
+        <p:blipFill rotWithShape="1">
+          <a:blip r:embed="rId3"/>
+          <a:srcRect l="89925" t="84701" r="772" b="2117"/>
+          <a:stretch/>
+        </p:blipFill>
+        <p:spPr>
+          <a:xfrm>
+            <a:off x="5093017" y="4180433"/>
+            <a:ext cx="281941" cy="273752"/>
+          </a:xfrm>
+          <a:prstGeom prst="rect">
+            <a:avLst/>
+          </a:prstGeom>
+        </p:spPr>
+      </p:pic>
+      <p:cxnSp>
+        <p:nvCxnSpPr>
+          <p:cNvPr id="8" name="Connettore 2 7">
+            <a:extLst>
+              <a:ext uri="{FF2B5EF4-FFF2-40B4-BE49-F238E27FC236}">
+                <a16:creationId xmlns:a16="http://schemas.microsoft.com/office/drawing/2014/main" id="{D42344DA-2E3A-C086-D330-34C0A80DFFDE}"/>
+              </a:ext>
+            </a:extLst>
+          </p:cNvPr>
+          <p:cNvCxnSpPr>
+            <a:cxnSpLocks/>
+          </p:cNvCxnSpPr>
+          <p:nvPr/>
+        </p:nvCxnSpPr>
+        <p:spPr>
+          <a:xfrm flipV="1">
+            <a:off x="6821805" y="2041843"/>
+            <a:ext cx="2078355" cy="1273720"/>
+          </a:xfrm>
+          <a:prstGeom prst="straightConnector1">
+            <a:avLst/>
+          </a:prstGeom>
+          <a:ln>
+            <a:solidFill>
+              <a:schemeClr val="bg1"/>
+            </a:solidFill>
+            <a:tailEnd type="triangle"/>
+          </a:ln>
+        </p:spPr>
+        <p:style>
+          <a:lnRef idx="1">
+            <a:schemeClr val="accent1"/>
+          </a:lnRef>
+          <a:fillRef idx="0">
+            <a:schemeClr val="accent1"/>
+          </a:fillRef>
+          <a:effectRef idx="0">
+            <a:schemeClr val="accent1"/>
+          </a:effectRef>
+          <a:fontRef idx="minor">
+            <a:schemeClr val="tx1"/>
+          </a:fontRef>
+        </p:style>
+      </p:cxnSp>
+      <p:pic>
+        <p:nvPicPr>
+          <p:cNvPr id="5" name="Immagine 4">
+            <a:extLst>
+              <a:ext uri="{FF2B5EF4-FFF2-40B4-BE49-F238E27FC236}">
+                <a16:creationId xmlns:a16="http://schemas.microsoft.com/office/drawing/2014/main" id="{BD27D4E7-86C7-A0F4-0E2C-92F2FAD78F9E}"/>
+              </a:ext>
+            </a:extLst>
+          </p:cNvPr>
+          <p:cNvPicPr>
+            <a:picLocks noChangeAspect="1"/>
+          </p:cNvPicPr>
+          <p:nvPr/>
+        </p:nvPicPr>
+        <p:blipFill rotWithShape="1">
+          <a:blip r:embed="rId3"/>
+          <a:srcRect l="90800" t="42108" r="-121" b="43514"/>
+          <a:stretch/>
+        </p:blipFill>
+        <p:spPr>
+          <a:xfrm>
+            <a:off x="6680835" y="3177063"/>
+            <a:ext cx="281940" cy="298049"/>
+          </a:xfrm>
+          <a:prstGeom prst="rect">
+            <a:avLst/>
+          </a:prstGeom>
+        </p:spPr>
+      </p:pic>
+      <p:sp>
+        <p:nvSpPr>
+          <p:cNvPr id="18" name="CasellaDiTesto 17">
+            <a:extLst>
+              <a:ext uri="{FF2B5EF4-FFF2-40B4-BE49-F238E27FC236}">
+                <a16:creationId xmlns:a16="http://schemas.microsoft.com/office/drawing/2014/main" id="{6E44B4C2-11C8-2765-E9F6-9735670850D7}"/>
+              </a:ext>
+            </a:extLst>
+          </p:cNvPr>
+          <p:cNvSpPr txBox="1"/>
+          <p:nvPr/>
+        </p:nvSpPr>
+        <p:spPr>
+          <a:xfrm>
+            <a:off x="8522973" y="1766115"/>
+            <a:ext cx="1276350" cy="276999"/>
+          </a:xfrm>
+          <a:prstGeom prst="rect">
+            <a:avLst/>
+          </a:prstGeom>
+          <a:noFill/>
+          <a:ln>
+            <a:solidFill>
+              <a:schemeClr val="bg1"/>
+            </a:solidFill>
+          </a:ln>
+        </p:spPr>
+        <p:txBody>
+          <a:bodyPr wrap="square" rtlCol="0">
+            <a:spAutoFit/>
+          </a:bodyPr>
+          <a:lstStyle/>
+          <a:p>
+            <a:pPr algn="ctr"/>
+            <a:r>
+              <a:rPr lang="it-IT" sz="1200" dirty="0">
+                <a:solidFill>
+                  <a:schemeClr val="bg1"/>
+                </a:solidFill>
+                <a:latin typeface="Joystix Monospace" panose="02010609020102020304" pitchFamily="49" charset="0"/>
+              </a:rPr>
+              <a:t>POWER UP</a:t>
+            </a:r>
+            <a:endParaRPr lang="it-IT" sz="1200" dirty="0">
+              <a:solidFill>
+                <a:srgbClr val="FF0000"/>
+              </a:solidFill>
+              <a:latin typeface="Joystix Monospace" panose="02010609020102020304" pitchFamily="49" charset="0"/>
+            </a:endParaRPr>
+          </a:p>
+        </p:txBody>
+      </p:sp>
     </p:spTree>
     <p:extLst>
       <p:ext uri="{BB962C8B-B14F-4D97-AF65-F5344CB8AC3E}">
@@ -4079,7 +4907,7 @@
 </p:sld>
 </file>
 
-<file path=ppt/slides/slide4.xml><?xml version="1.0" encoding="utf-8"?>
+<file path=ppt/slides/slide7.xml><?xml version="1.0" encoding="utf-8"?>
 <p:sld xmlns:a="http://schemas.openxmlformats.org/drawingml/2006/main" xmlns:r="http://schemas.openxmlformats.org/officeDocument/2006/relationships" xmlns:p="http://schemas.openxmlformats.org/presentationml/2006/main">
   <p:cSld>
     <p:bg>
@@ -4109,7 +4937,7 @@
           <p:cNvPr id="2" name="CasellaDiTesto 1">
             <a:extLst>
               <a:ext uri="{FF2B5EF4-FFF2-40B4-BE49-F238E27FC236}">
-                <a16:creationId xmlns:a16="http://schemas.microsoft.com/office/drawing/2014/main" id="{7761A8D3-44DE-E5DB-738C-061BC868F717}"/>
+                <a16:creationId xmlns:a16="http://schemas.microsoft.com/office/drawing/2014/main" id="{6240EE66-841F-7B32-6F16-BCD8147448B2}"/>
               </a:ext>
             </a:extLst>
           </p:cNvPr>
@@ -4118,8 +4946,8 @@
         </p:nvSpPr>
         <p:spPr>
           <a:xfrm>
-            <a:off x="2187630" y="2521059"/>
-            <a:ext cx="7816739" cy="1815882"/>
+            <a:off x="669951" y="1413897"/>
+            <a:ext cx="10852095" cy="954107"/>
           </a:xfrm>
           <a:prstGeom prst="rect">
             <a:avLst/>
@@ -4140,9 +4968,47 @@
                 </a:solidFill>
                 <a:latin typeface="Joystix Monospace" panose="02010609020102020304" pitchFamily="49" charset="0"/>
               </a:rPr>
-              <a:t>Le regole sono molto semplici:</a:t>
-            </a:r>
-          </a:p>
+              <a:t>La gestione del gioco è completamente affidata a un </a:t>
+            </a:r>
+            <a:r>
+              <a:rPr lang="it-IT" sz="2800" dirty="0">
+                <a:solidFill>
+                  <a:srgbClr val="FF0000"/>
+                </a:solidFill>
+                <a:latin typeface="Joystix Monospace" panose="02010609020102020304" pitchFamily="49" charset="0"/>
+              </a:rPr>
+              <a:t>server</a:t>
+            </a:r>
+          </a:p>
+        </p:txBody>
+      </p:sp>
+      <p:sp>
+        <p:nvSpPr>
+          <p:cNvPr id="3" name="CasellaDiTesto 2">
+            <a:extLst>
+              <a:ext uri="{FF2B5EF4-FFF2-40B4-BE49-F238E27FC236}">
+                <a16:creationId xmlns:a16="http://schemas.microsoft.com/office/drawing/2014/main" id="{81D0D9F6-DBAA-1C53-E580-3506CD81685F}"/>
+              </a:ext>
+            </a:extLst>
+          </p:cNvPr>
+          <p:cNvSpPr txBox="1"/>
+          <p:nvPr/>
+        </p:nvSpPr>
+        <p:spPr>
+          <a:xfrm>
+            <a:off x="669952" y="3197334"/>
+            <a:ext cx="10852095" cy="2246769"/>
+          </a:xfrm>
+          <a:prstGeom prst="rect">
+            <a:avLst/>
+          </a:prstGeom>
+          <a:noFill/>
+        </p:spPr>
+        <p:txBody>
+          <a:bodyPr wrap="square" rtlCol="0">
+            <a:spAutoFit/>
+          </a:bodyPr>
+          <a:lstStyle/>
           <a:p>
             <a:pPr algn="ctr"/>
             <a:r>
@@ -4152,39 +5018,24 @@
                 </a:solidFill>
                 <a:latin typeface="Joystix Monospace" panose="02010609020102020304" pitchFamily="49" charset="0"/>
               </a:rPr>
-              <a:t>Il primo giocatore a vincere </a:t>
-            </a:r>
-            <a:r>
-              <a:rPr lang="it-IT" sz="2800">
-                <a:solidFill>
-                  <a:schemeClr val="bg1"/>
-                </a:solidFill>
-                <a:latin typeface="Joystix Monospace" panose="02010609020102020304" pitchFamily="49" charset="0"/>
-              </a:rPr>
-              <a:t>tre set </a:t>
-            </a:r>
-            <a:r>
-              <a:rPr lang="it-IT" sz="2800">
+              <a:t>I messaggi di invio/chiusura, il campo iniziale e il campo aggiornato vengono quindi elaborati del server che invia le informazioni ai due giocatori sottoforma di stringa </a:t>
+            </a:r>
+            <a:r>
+              <a:rPr lang="it-IT" sz="2800" dirty="0">
                 <a:solidFill>
                   <a:srgbClr val="FF0000"/>
                 </a:solidFill>
                 <a:latin typeface="Joystix Monospace" panose="02010609020102020304" pitchFamily="49" charset="0"/>
               </a:rPr>
-              <a:t>vince</a:t>
-            </a:r>
-            <a:endParaRPr lang="it-IT" sz="2800" dirty="0">
-              <a:solidFill>
-                <a:srgbClr val="FF0000"/>
-              </a:solidFill>
-              <a:latin typeface="Joystix Monospace" panose="02010609020102020304" pitchFamily="49" charset="0"/>
-            </a:endParaRPr>
+              <a:t>xml</a:t>
+            </a:r>
           </a:p>
         </p:txBody>
       </p:sp>
     </p:spTree>
     <p:extLst>
       <p:ext uri="{BB962C8B-B14F-4D97-AF65-F5344CB8AC3E}">
-        <p14:creationId xmlns:p14="http://schemas.microsoft.com/office/powerpoint/2010/main" val="3239394465"/>
+        <p14:creationId xmlns:p14="http://schemas.microsoft.com/office/powerpoint/2010/main" val="623085910"/>
       </p:ext>
     </p:extLst>
   </p:cSld>
@@ -4194,7 +5045,7 @@
 </p:sld>
 </file>
 
-<file path=ppt/slides/slide5.xml><?xml version="1.0" encoding="utf-8"?>
+<file path=ppt/slides/slide8.xml><?xml version="1.0" encoding="utf-8"?>
 <p:sld xmlns:a="http://schemas.openxmlformats.org/drawingml/2006/main" xmlns:r="http://schemas.openxmlformats.org/officeDocument/2006/relationships" xmlns:p="http://schemas.openxmlformats.org/presentationml/2006/main">
   <p:cSld>
     <p:bg>
@@ -4233,8 +5084,8 @@
         </p:nvSpPr>
         <p:spPr>
           <a:xfrm>
-            <a:off x="669951" y="1413897"/>
-            <a:ext cx="10852095" cy="954107"/>
+            <a:off x="553640" y="1613118"/>
+            <a:ext cx="11084714" cy="954107"/>
           </a:xfrm>
           <a:prstGeom prst="rect">
             <a:avLst/>
@@ -4255,7 +5106,53 @@
                 </a:solidFill>
                 <a:latin typeface="Joystix Monospace" panose="02010609020102020304" pitchFamily="49" charset="0"/>
               </a:rPr>
-              <a:t>La gestione del gioco è completamente affidata a un </a:t>
+              <a:t>Per la realizzazione del gioco abbiamo utilizzato varie librerie tra cui:</a:t>
+            </a:r>
+            <a:endParaRPr lang="it-IT" sz="2800" dirty="0">
+              <a:solidFill>
+                <a:srgbClr val="FF0000"/>
+              </a:solidFill>
+              <a:latin typeface="Joystix Monospace" panose="02010609020102020304" pitchFamily="49" charset="0"/>
+            </a:endParaRPr>
+          </a:p>
+        </p:txBody>
+      </p:sp>
+      <p:sp>
+        <p:nvSpPr>
+          <p:cNvPr id="3" name="CasellaDiTesto 2">
+            <a:extLst>
+              <a:ext uri="{FF2B5EF4-FFF2-40B4-BE49-F238E27FC236}">
+                <a16:creationId xmlns:a16="http://schemas.microsoft.com/office/drawing/2014/main" id="{81D0D9F6-DBAA-1C53-E580-3506CD81685F}"/>
+              </a:ext>
+            </a:extLst>
+          </p:cNvPr>
+          <p:cNvSpPr txBox="1"/>
+          <p:nvPr/>
+        </p:nvSpPr>
+        <p:spPr>
+          <a:xfrm>
+            <a:off x="553640" y="3429000"/>
+            <a:ext cx="11084714" cy="1815882"/>
+          </a:xfrm>
+          <a:prstGeom prst="rect">
+            <a:avLst/>
+          </a:prstGeom>
+          <a:noFill/>
+        </p:spPr>
+        <p:txBody>
+          <a:bodyPr wrap="square" rtlCol="0">
+            <a:spAutoFit/>
+          </a:bodyPr>
+          <a:lstStyle/>
+          <a:p>
+            <a:r>
+              <a:rPr lang="it-IT" sz="2800" dirty="0">
+                <a:solidFill>
+                  <a:schemeClr val="bg1"/>
+                </a:solidFill>
+                <a:latin typeface="Joystix Monospace" panose="02010609020102020304" pitchFamily="49" charset="0"/>
+              </a:rPr>
+              <a:t>java.io &amp; .util: utilità </a:t>
             </a:r>
             <a:r>
               <a:rPr lang="it-IT" sz="2800" dirty="0">
@@ -4264,40 +5161,10 @@
                 </a:solidFill>
                 <a:latin typeface="Joystix Monospace" panose="02010609020102020304" pitchFamily="49" charset="0"/>
               </a:rPr>
-              <a:t>server</a:t>
-            </a:r>
-          </a:p>
-        </p:txBody>
-      </p:sp>
-      <p:sp>
-        <p:nvSpPr>
-          <p:cNvPr id="3" name="CasellaDiTesto 2">
-            <a:extLst>
-              <a:ext uri="{FF2B5EF4-FFF2-40B4-BE49-F238E27FC236}">
-                <a16:creationId xmlns:a16="http://schemas.microsoft.com/office/drawing/2014/main" id="{81D0D9F6-DBAA-1C53-E580-3506CD81685F}"/>
-              </a:ext>
-            </a:extLst>
-          </p:cNvPr>
-          <p:cNvSpPr txBox="1"/>
-          <p:nvPr/>
-        </p:nvSpPr>
-        <p:spPr>
-          <a:xfrm>
-            <a:off x="669952" y="3197334"/>
-            <a:ext cx="10852095" cy="2246769"/>
-          </a:xfrm>
-          <a:prstGeom prst="rect">
-            <a:avLst/>
-          </a:prstGeom>
-          <a:noFill/>
-        </p:spPr>
-        <p:txBody>
-          <a:bodyPr wrap="square" rtlCol="0">
-            <a:spAutoFit/>
-          </a:bodyPr>
-          <a:lstStyle/>
-          <a:p>
-            <a:pPr algn="ctr"/>
+              <a:t>varie</a:t>
+            </a:r>
+          </a:p>
+          <a:p>
             <a:r>
               <a:rPr lang="it-IT" sz="2800" dirty="0">
                 <a:solidFill>
@@ -4305,7 +5172,47 @@
                 </a:solidFill>
                 <a:latin typeface="Joystix Monospace" panose="02010609020102020304" pitchFamily="49" charset="0"/>
               </a:rPr>
-              <a:t>I messaggi di invio/chiusura, il campo iniziale e il campo aggiornato vengono quindi elaborati del server che invia le informazioni ai due giocatori sottoforma di stringa </a:t>
+              <a:t>java.swing &amp; .awt: interfaccia </a:t>
+            </a:r>
+            <a:r>
+              <a:rPr lang="it-IT" sz="2800" dirty="0">
+                <a:solidFill>
+                  <a:srgbClr val="FF0000"/>
+                </a:solidFill>
+                <a:latin typeface="Joystix Monospace" panose="02010609020102020304" pitchFamily="49" charset="0"/>
+              </a:rPr>
+              <a:t>grafica</a:t>
+            </a:r>
+          </a:p>
+          <a:p>
+            <a:r>
+              <a:rPr lang="it-IT" sz="2800" dirty="0">
+                <a:solidFill>
+                  <a:schemeClr val="bg1"/>
+                </a:solidFill>
+                <a:latin typeface="Joystix Monospace" panose="02010609020102020304" pitchFamily="49" charset="0"/>
+              </a:rPr>
+              <a:t>java.Net: comunicazione </a:t>
+            </a:r>
+            <a:r>
+              <a:rPr lang="it-IT" sz="2800" dirty="0">
+                <a:solidFill>
+                  <a:srgbClr val="FF0000"/>
+                </a:solidFill>
+                <a:latin typeface="Joystix Monospace" panose="02010609020102020304" pitchFamily="49" charset="0"/>
+              </a:rPr>
+              <a:t>tcp/ip</a:t>
+            </a:r>
+          </a:p>
+          <a:p>
+            <a:r>
+              <a:rPr lang="it-IT" sz="2800" dirty="0">
+                <a:solidFill>
+                  <a:schemeClr val="bg1"/>
+                </a:solidFill>
+                <a:latin typeface="Joystix Monospace" panose="02010609020102020304" pitchFamily="49" charset="0"/>
+              </a:rPr>
+              <a:t>javax.xml &amp; org.w3c.dom: parsing </a:t>
             </a:r>
             <a:r>
               <a:rPr lang="it-IT" sz="2800" dirty="0">
@@ -4322,7 +5229,7 @@
     </p:spTree>
     <p:extLst>
       <p:ext uri="{BB962C8B-B14F-4D97-AF65-F5344CB8AC3E}">
-        <p14:creationId xmlns:p14="http://schemas.microsoft.com/office/powerpoint/2010/main" val="623085910"/>
+        <p14:creationId xmlns:p14="http://schemas.microsoft.com/office/powerpoint/2010/main" val="926578633"/>
       </p:ext>
     </p:extLst>
   </p:cSld>
@@ -4332,144 +5239,7 @@
 </p:sld>
 </file>
 
-<file path=ppt/slides/slide6.xml><?xml version="1.0" encoding="utf-8"?>
-<p:sld xmlns:a="http://schemas.openxmlformats.org/drawingml/2006/main" xmlns:r="http://schemas.openxmlformats.org/officeDocument/2006/relationships" xmlns:p="http://schemas.openxmlformats.org/presentationml/2006/main">
-  <p:cSld>
-    <p:bg>
-      <p:bgPr>
-        <a:solidFill>
-          <a:schemeClr val="tx1"/>
-        </a:solidFill>
-        <a:effectLst/>
-      </p:bgPr>
-    </p:bg>
-    <p:spTree>
-      <p:nvGrpSpPr>
-        <p:cNvPr id="1" name=""/>
-        <p:cNvGrpSpPr/>
-        <p:nvPr/>
-      </p:nvGrpSpPr>
-      <p:grpSpPr>
-        <a:xfrm>
-          <a:off x="0" y="0"/>
-          <a:ext cx="0" cy="0"/>
-          <a:chOff x="0" y="0"/>
-          <a:chExt cx="0" cy="0"/>
-        </a:xfrm>
-      </p:grpSpPr>
-      <p:sp>
-        <p:nvSpPr>
-          <p:cNvPr id="3" name="CasellaDiTesto 2">
-            <a:extLst>
-              <a:ext uri="{FF2B5EF4-FFF2-40B4-BE49-F238E27FC236}">
-                <a16:creationId xmlns:a16="http://schemas.microsoft.com/office/drawing/2014/main" id="{81D0D9F6-DBAA-1C53-E580-3506CD81685F}"/>
-              </a:ext>
-            </a:extLst>
-          </p:cNvPr>
-          <p:cNvSpPr txBox="1"/>
-          <p:nvPr/>
-        </p:nvSpPr>
-        <p:spPr>
-          <a:xfrm>
-            <a:off x="900801" y="2521059"/>
-            <a:ext cx="10390397" cy="1815882"/>
-          </a:xfrm>
-          <a:prstGeom prst="rect">
-            <a:avLst/>
-          </a:prstGeom>
-          <a:noFill/>
-        </p:spPr>
-        <p:txBody>
-          <a:bodyPr wrap="square" rtlCol="0">
-            <a:spAutoFit/>
-          </a:bodyPr>
-          <a:lstStyle/>
-          <a:p>
-            <a:pPr marL="0" marR="0" lvl="0" indent="0" algn="ctr" defTabSz="914400" rtl="0" eaLnBrk="1" fontAlgn="auto" latinLnBrk="0" hangingPunct="1">
-              <a:lnSpc>
-                <a:spcPct val="100000"/>
-              </a:lnSpc>
-              <a:spcBef>
-                <a:spcPts val="0"/>
-              </a:spcBef>
-              <a:spcAft>
-                <a:spcPts val="0"/>
-              </a:spcAft>
-              <a:buClrTx/>
-              <a:buSzTx/>
-              <a:buFontTx/>
-              <a:buNone/>
-              <a:tabLst/>
-              <a:defRPr/>
-            </a:pPr>
-            <a:r>
-              <a:rPr kumimoji="0" lang="it-IT" sz="2800" b="0" i="0" u="none" strike="noStrike" kern="1200" cap="none" spc="0" normalizeH="0" baseline="0" noProof="0" dirty="0">
-                <a:ln>
-                  <a:noFill/>
-                </a:ln>
-                <a:solidFill>
-                  <a:prstClr val="white"/>
-                </a:solidFill>
-                <a:effectLst/>
-                <a:uLnTx/>
-                <a:uFillTx/>
-                <a:latin typeface="Joystix Monospace" panose="02010609020102020304" pitchFamily="49" charset="0"/>
-                <a:ea typeface="+mn-ea"/>
-                <a:cs typeface="+mn-cs"/>
-              </a:rPr>
-              <a:t>Per rendere il gioco più divertente e intrigante abbiamo optato per l’aggiunta di </a:t>
-            </a:r>
-            <a:r>
-              <a:rPr kumimoji="0" lang="it-IT" sz="2800" b="0" i="0" u="none" strike="noStrike" kern="1200" cap="none" spc="0" normalizeH="0" baseline="0" noProof="0" dirty="0">
-                <a:ln>
-                  <a:noFill/>
-                </a:ln>
-                <a:solidFill>
-                  <a:srgbClr val="FF0000"/>
-                </a:solidFill>
-                <a:effectLst/>
-                <a:uLnTx/>
-                <a:uFillTx/>
-                <a:latin typeface="Joystix Monospace" panose="02010609020102020304" pitchFamily="49" charset="0"/>
-                <a:ea typeface="+mn-ea"/>
-                <a:cs typeface="+mn-cs"/>
-              </a:rPr>
-              <a:t>power up </a:t>
-            </a:r>
-            <a:r>
-              <a:rPr kumimoji="0" lang="it-IT" sz="2800" b="0" i="0" u="none" strike="noStrike" kern="1200" cap="none" spc="0" normalizeH="0" baseline="0" noProof="0" dirty="0">
-                <a:ln>
-                  <a:noFill/>
-                </a:ln>
-                <a:solidFill>
-                  <a:schemeClr val="bg1"/>
-                </a:solidFill>
-                <a:effectLst/>
-                <a:uLnTx/>
-                <a:uFillTx/>
-                <a:latin typeface="Joystix Monospace" panose="02010609020102020304" pitchFamily="49" charset="0"/>
-                <a:ea typeface="+mn-ea"/>
-                <a:cs typeface="+mn-cs"/>
-              </a:rPr>
-              <a:t>che si generano regolarmente</a:t>
-            </a:r>
-          </a:p>
-        </p:txBody>
-      </p:sp>
-    </p:spTree>
-    <p:extLst>
-      <p:ext uri="{BB962C8B-B14F-4D97-AF65-F5344CB8AC3E}">
-        <p14:creationId xmlns:p14="http://schemas.microsoft.com/office/powerpoint/2010/main" val="2590835278"/>
-      </p:ext>
-    </p:extLst>
-  </p:cSld>
-  <p:clrMapOvr>
-    <a:masterClrMapping/>
-  </p:clrMapOvr>
-</p:sld>
-</file>
-
-<file path=ppt/slides/slide7.xml><?xml version="1.0" encoding="utf-8"?>
+<file path=ppt/slides/slide9.xml><?xml version="1.0" encoding="utf-8"?>
 <p:sld xmlns:a="http://schemas.openxmlformats.org/drawingml/2006/main" xmlns:r="http://schemas.openxmlformats.org/officeDocument/2006/relationships" xmlns:p="http://schemas.openxmlformats.org/presentationml/2006/main">
   <p:cSld>
     <p:bg>

</xml_diff>